<commit_message>
added architecture pictures and crude property calculator
</commit_message>
<xml_diff>
--- a/Generalized Method of Cells (08-01-2014).pptx
+++ b/Generalized Method of Cells (08-01-2014).pptx
@@ -4,13 +4,19 @@
   <p:sldMasterIdLst>
     <p:sldMasterId id="2147483648" r:id="rId1"/>
   </p:sldMasterIdLst>
+  <p:handoutMasterIdLst>
+    <p:handoutMasterId r:id="rId8"/>
+  </p:handoutMasterIdLst>
   <p:sldIdLst>
     <p:sldId id="256" r:id="rId2"/>
     <p:sldId id="257" r:id="rId3"/>
     <p:sldId id="258" r:id="rId4"/>
+    <p:sldId id="259" r:id="rId5"/>
+    <p:sldId id="260" r:id="rId6"/>
+    <p:sldId id="261" r:id="rId7"/>
   </p:sldIdLst>
   <p:sldSz cx="12192000" cy="6858000"/>
-  <p:notesSz cx="6858000" cy="9144000"/>
+  <p:notesSz cx="6985000" cy="9283700"/>
   <p:defaultTextStyle>
     <a:defPPr>
       <a:defRPr lang="en-US"/>
@@ -106,7 +112,177 @@
       </a:defRPr>
     </a:lvl9pPr>
   </p:defaultTextStyle>
+  <p:extLst>
+    <p:ext uri="{EFAFB233-063F-42B5-8137-9DF3F51BA10A}">
+      <p15:sldGuideLst xmlns:p15="http://schemas.microsoft.com/office/powerpoint/2012/main"/>
+    </p:ext>
+  </p:extLst>
 </p:presentation>
+</file>
+
+<file path=ppt/handoutMasters/handoutMaster1.xml><?xml version="1.0" encoding="utf-8"?>
+<p:handoutMaster xmlns:a="http://schemas.openxmlformats.org/drawingml/2006/main" xmlns:r="http://schemas.openxmlformats.org/officeDocument/2006/relationships" xmlns:p="http://schemas.openxmlformats.org/presentationml/2006/main">
+  <p:cSld>
+    <p:bg>
+      <p:bgRef idx="1001">
+        <a:schemeClr val="bg1"/>
+      </p:bgRef>
+    </p:bg>
+    <p:spTree>
+      <p:nvGrpSpPr>
+        <p:cNvPr id="1" name=""/>
+        <p:cNvGrpSpPr/>
+        <p:nvPr/>
+      </p:nvGrpSpPr>
+      <p:grpSpPr>
+        <a:xfrm>
+          <a:off x="0" y="0"/>
+          <a:ext cx="0" cy="0"/>
+          <a:chOff x="0" y="0"/>
+          <a:chExt cx="0" cy="0"/>
+        </a:xfrm>
+      </p:grpSpPr>
+      <p:sp>
+        <p:nvSpPr>
+          <p:cNvPr id="2" name="Header Placeholder 1"/>
+          <p:cNvSpPr>
+            <a:spLocks noGrp="1"/>
+          </p:cNvSpPr>
+          <p:nvPr>
+            <p:ph type="hdr" sz="quarter"/>
+          </p:nvPr>
+        </p:nvSpPr>
+        <p:spPr>
+          <a:xfrm>
+            <a:off x="0" y="0"/>
+            <a:ext cx="3026833" cy="465797"/>
+          </a:xfrm>
+          <a:prstGeom prst="rect">
+            <a:avLst/>
+          </a:prstGeom>
+        </p:spPr>
+        <p:txBody>
+          <a:bodyPr vert="horz" lIns="92958" tIns="46479" rIns="92958" bIns="46479" rtlCol="0"/>
+          <a:lstStyle>
+            <a:lvl1pPr algn="l">
+              <a:defRPr sz="1200"/>
+            </a:lvl1pPr>
+          </a:lstStyle>
+          <a:p>
+            <a:endParaRPr lang="en-US"/>
+          </a:p>
+        </p:txBody>
+      </p:sp>
+      <p:sp>
+        <p:nvSpPr>
+          <p:cNvPr id="3" name="Date Placeholder 2"/>
+          <p:cNvSpPr>
+            <a:spLocks noGrp="1"/>
+          </p:cNvSpPr>
+          <p:nvPr>
+            <p:ph type="dt" sz="quarter" idx="1"/>
+          </p:nvPr>
+        </p:nvSpPr>
+        <p:spPr>
+          <a:xfrm>
+            <a:off x="3956550" y="0"/>
+            <a:ext cx="3026833" cy="465797"/>
+          </a:xfrm>
+          <a:prstGeom prst="rect">
+            <a:avLst/>
+          </a:prstGeom>
+        </p:spPr>
+        <p:txBody>
+          <a:bodyPr vert="horz" lIns="92958" tIns="46479" rIns="92958" bIns="46479" rtlCol="0"/>
+          <a:lstStyle>
+            <a:lvl1pPr algn="r">
+              <a:defRPr sz="1200"/>
+            </a:lvl1pPr>
+          </a:lstStyle>
+          <a:p>
+            <a:fld id="{7B333BA5-51A3-40A0-B8B6-6449580A3234}" type="datetimeFigureOut">
+              <a:rPr lang="en-US" smtClean="0"/>
+              <a:t>7/29/2014</a:t>
+            </a:fld>
+            <a:endParaRPr lang="en-US"/>
+          </a:p>
+        </p:txBody>
+      </p:sp>
+      <p:sp>
+        <p:nvSpPr>
+          <p:cNvPr id="4" name="Footer Placeholder 3"/>
+          <p:cNvSpPr>
+            <a:spLocks noGrp="1"/>
+          </p:cNvSpPr>
+          <p:nvPr>
+            <p:ph type="ftr" sz="quarter" idx="2"/>
+          </p:nvPr>
+        </p:nvSpPr>
+        <p:spPr>
+          <a:xfrm>
+            <a:off x="0" y="8817904"/>
+            <a:ext cx="3026833" cy="465796"/>
+          </a:xfrm>
+          <a:prstGeom prst="rect">
+            <a:avLst/>
+          </a:prstGeom>
+        </p:spPr>
+        <p:txBody>
+          <a:bodyPr vert="horz" lIns="92958" tIns="46479" rIns="92958" bIns="46479" rtlCol="0" anchor="b"/>
+          <a:lstStyle>
+            <a:lvl1pPr algn="l">
+              <a:defRPr sz="1200"/>
+            </a:lvl1pPr>
+          </a:lstStyle>
+          <a:p>
+            <a:endParaRPr lang="en-US"/>
+          </a:p>
+        </p:txBody>
+      </p:sp>
+      <p:sp>
+        <p:nvSpPr>
+          <p:cNvPr id="5" name="Slide Number Placeholder 4"/>
+          <p:cNvSpPr>
+            <a:spLocks noGrp="1"/>
+          </p:cNvSpPr>
+          <p:nvPr>
+            <p:ph type="sldNum" sz="quarter" idx="3"/>
+          </p:nvPr>
+        </p:nvSpPr>
+        <p:spPr>
+          <a:xfrm>
+            <a:off x="3956550" y="8817904"/>
+            <a:ext cx="3026833" cy="465796"/>
+          </a:xfrm>
+          <a:prstGeom prst="rect">
+            <a:avLst/>
+          </a:prstGeom>
+        </p:spPr>
+        <p:txBody>
+          <a:bodyPr vert="horz" lIns="92958" tIns="46479" rIns="92958" bIns="46479" rtlCol="0" anchor="b"/>
+          <a:lstStyle>
+            <a:lvl1pPr algn="r">
+              <a:defRPr sz="1200"/>
+            </a:lvl1pPr>
+          </a:lstStyle>
+          <a:p>
+            <a:fld id="{6D2D5F3B-5AB0-4566-956B-E53570F02343}" type="slidenum">
+              <a:rPr lang="en-US" smtClean="0"/>
+              <a:t>‹#›</a:t>
+            </a:fld>
+            <a:endParaRPr lang="en-US"/>
+          </a:p>
+        </p:txBody>
+      </p:sp>
+    </p:spTree>
+    <p:extLst>
+      <p:ext uri="{BB962C8B-B14F-4D97-AF65-F5344CB8AC3E}">
+        <p14:creationId xmlns:p14="http://schemas.microsoft.com/office/powerpoint/2010/main" val="1359270128"/>
+      </p:ext>
+    </p:extLst>
+  </p:cSld>
+  <p:clrMap bg1="lt1" tx1="dk1" bg2="lt2" tx2="dk2" accent1="accent1" accent2="accent2" accent3="accent3" accent4="accent4" accent5="accent5" accent6="accent6" hlink="hlink" folHlink="folHlink"/>
+</p:handoutMaster>
 </file>
 
 <file path=ppt/slideLayouts/slideLayout1.xml><?xml version="1.0" encoding="utf-8"?>
@@ -240,7 +416,7 @@
           <a:p>
             <a:fld id="{7BB2BC7A-0E1A-4CB9-A35A-811A5CB4BDAF}" type="datetimeFigureOut">
               <a:rPr lang="en-US" smtClean="0"/>
-              <a:t>7/25/2014</a:t>
+              <a:t>7/29/2014</a:t>
             </a:fld>
             <a:endParaRPr lang="en-US"/>
           </a:p>
@@ -410,7 +586,7 @@
           <a:p>
             <a:fld id="{7BB2BC7A-0E1A-4CB9-A35A-811A5CB4BDAF}" type="datetimeFigureOut">
               <a:rPr lang="en-US" smtClean="0"/>
-              <a:t>7/25/2014</a:t>
+              <a:t>7/29/2014</a:t>
             </a:fld>
             <a:endParaRPr lang="en-US"/>
           </a:p>
@@ -590,7 +766,7 @@
           <a:p>
             <a:fld id="{7BB2BC7A-0E1A-4CB9-A35A-811A5CB4BDAF}" type="datetimeFigureOut">
               <a:rPr lang="en-US" smtClean="0"/>
-              <a:t>7/25/2014</a:t>
+              <a:t>7/29/2014</a:t>
             </a:fld>
             <a:endParaRPr lang="en-US"/>
           </a:p>
@@ -760,7 +936,7 @@
           <a:p>
             <a:fld id="{7BB2BC7A-0E1A-4CB9-A35A-811A5CB4BDAF}" type="datetimeFigureOut">
               <a:rPr lang="en-US" smtClean="0"/>
-              <a:t>7/25/2014</a:t>
+              <a:t>7/29/2014</a:t>
             </a:fld>
             <a:endParaRPr lang="en-US"/>
           </a:p>
@@ -1006,7 +1182,7 @@
           <a:p>
             <a:fld id="{7BB2BC7A-0E1A-4CB9-A35A-811A5CB4BDAF}" type="datetimeFigureOut">
               <a:rPr lang="en-US" smtClean="0"/>
-              <a:t>7/25/2014</a:t>
+              <a:t>7/29/2014</a:t>
             </a:fld>
             <a:endParaRPr lang="en-US"/>
           </a:p>
@@ -1238,7 +1414,7 @@
           <a:p>
             <a:fld id="{7BB2BC7A-0E1A-4CB9-A35A-811A5CB4BDAF}" type="datetimeFigureOut">
               <a:rPr lang="en-US" smtClean="0"/>
-              <a:t>7/25/2014</a:t>
+              <a:t>7/29/2014</a:t>
             </a:fld>
             <a:endParaRPr lang="en-US"/>
           </a:p>
@@ -1605,7 +1781,7 @@
           <a:p>
             <a:fld id="{7BB2BC7A-0E1A-4CB9-A35A-811A5CB4BDAF}" type="datetimeFigureOut">
               <a:rPr lang="en-US" smtClean="0"/>
-              <a:t>7/25/2014</a:t>
+              <a:t>7/29/2014</a:t>
             </a:fld>
             <a:endParaRPr lang="en-US"/>
           </a:p>
@@ -1723,7 +1899,7 @@
           <a:p>
             <a:fld id="{7BB2BC7A-0E1A-4CB9-A35A-811A5CB4BDAF}" type="datetimeFigureOut">
               <a:rPr lang="en-US" smtClean="0"/>
-              <a:t>7/25/2014</a:t>
+              <a:t>7/29/2014</a:t>
             </a:fld>
             <a:endParaRPr lang="en-US"/>
           </a:p>
@@ -1818,7 +1994,7 @@
           <a:p>
             <a:fld id="{7BB2BC7A-0E1A-4CB9-A35A-811A5CB4BDAF}" type="datetimeFigureOut">
               <a:rPr lang="en-US" smtClean="0"/>
-              <a:t>7/25/2014</a:t>
+              <a:t>7/29/2014</a:t>
             </a:fld>
             <a:endParaRPr lang="en-US"/>
           </a:p>
@@ -2095,7 +2271,7 @@
           <a:p>
             <a:fld id="{7BB2BC7A-0E1A-4CB9-A35A-811A5CB4BDAF}" type="datetimeFigureOut">
               <a:rPr lang="en-US" smtClean="0"/>
-              <a:t>7/25/2014</a:t>
+              <a:t>7/29/2014</a:t>
             </a:fld>
             <a:endParaRPr lang="en-US"/>
           </a:p>
@@ -2348,7 +2524,7 @@
           <a:p>
             <a:fld id="{7BB2BC7A-0E1A-4CB9-A35A-811A5CB4BDAF}" type="datetimeFigureOut">
               <a:rPr lang="en-US" smtClean="0"/>
-              <a:t>7/25/2014</a:t>
+              <a:t>7/29/2014</a:t>
             </a:fld>
             <a:endParaRPr lang="en-US"/>
           </a:p>
@@ -2561,7 +2737,7 @@
           <a:p>
             <a:fld id="{7BB2BC7A-0E1A-4CB9-A35A-811A5CB4BDAF}" type="datetimeFigureOut">
               <a:rPr lang="en-US" smtClean="0"/>
-              <a:t>7/25/2014</a:t>
+              <a:t>7/29/2014</a:t>
             </a:fld>
             <a:endParaRPr lang="en-US"/>
           </a:p>
@@ -3245,11 +3421,15 @@
               <a:t>subcell</a:t>
             </a:r>
             <a:r>
-              <a:rPr lang="en-US" smtClean="0"/>
+              <a:rPr lang="en-US" dirty="0" smtClean="0"/>
               <a:t> boundary</a:t>
             </a:r>
           </a:p>
           <a:p>
+            <a:r>
+              <a:rPr lang="en-US" dirty="0" smtClean="0"/>
+              <a:t>Periodic boundary conditions at the RUC boundaries</a:t>
+            </a:r>
             <a:endParaRPr lang="en-US" dirty="0"/>
           </a:p>
         </p:txBody>
@@ -3315,6 +3495,803 @@
     <p:extLst>
       <p:ext uri="{BB962C8B-B14F-4D97-AF65-F5344CB8AC3E}">
         <p14:creationId xmlns:p14="http://schemas.microsoft.com/office/powerpoint/2010/main" val="522980195"/>
+      </p:ext>
+    </p:extLst>
+  </p:cSld>
+  <p:clrMapOvr>
+    <a:masterClrMapping/>
+  </p:clrMapOvr>
+</p:sld>
+</file>
+
+<file path=ppt/slides/slide4.xml><?xml version="1.0" encoding="utf-8"?>
+<p:sld xmlns:a="http://schemas.openxmlformats.org/drawingml/2006/main" xmlns:r="http://schemas.openxmlformats.org/officeDocument/2006/relationships" xmlns:p="http://schemas.openxmlformats.org/presentationml/2006/main">
+  <p:cSld>
+    <p:spTree>
+      <p:nvGrpSpPr>
+        <p:cNvPr id="1" name=""/>
+        <p:cNvGrpSpPr/>
+        <p:nvPr/>
+      </p:nvGrpSpPr>
+      <p:grpSpPr>
+        <a:xfrm>
+          <a:off x="0" y="0"/>
+          <a:ext cx="0" cy="0"/>
+          <a:chOff x="0" y="0"/>
+          <a:chExt cx="0" cy="0"/>
+        </a:xfrm>
+      </p:grpSpPr>
+      <p:sp>
+        <p:nvSpPr>
+          <p:cNvPr id="2" name="Title 1"/>
+          <p:cNvSpPr>
+            <a:spLocks noGrp="1"/>
+          </p:cNvSpPr>
+          <p:nvPr>
+            <p:ph type="title"/>
+          </p:nvPr>
+        </p:nvSpPr>
+        <p:spPr/>
+        <p:txBody>
+          <a:bodyPr/>
+          <a:lstStyle/>
+          <a:p>
+            <a:r>
+              <a:rPr lang="en-US" dirty="0" smtClean="0"/>
+              <a:t>The Code</a:t>
+            </a:r>
+            <a:endParaRPr lang="en-US" dirty="0"/>
+          </a:p>
+        </p:txBody>
+      </p:sp>
+      <p:sp>
+        <p:nvSpPr>
+          <p:cNvPr id="3" name="Content Placeholder 2"/>
+          <p:cNvSpPr>
+            <a:spLocks noGrp="1"/>
+          </p:cNvSpPr>
+          <p:nvPr>
+            <p:ph sz="half" idx="1"/>
+          </p:nvPr>
+        </p:nvSpPr>
+        <p:spPr>
+          <a:xfrm>
+            <a:off x="838200" y="1825625"/>
+            <a:ext cx="5805668" cy="4351338"/>
+          </a:xfrm>
+        </p:spPr>
+        <p:txBody>
+          <a:bodyPr>
+            <a:normAutofit/>
+          </a:bodyPr>
+          <a:lstStyle/>
+          <a:p>
+            <a:r>
+              <a:rPr lang="en-US" dirty="0" smtClean="0"/>
+              <a:t>The code was written in MATLAB</a:t>
+            </a:r>
+          </a:p>
+          <a:p>
+            <a:r>
+              <a:rPr lang="en-US" dirty="0" smtClean="0"/>
+              <a:t>Code reads an input file and outputs stress, strain, and the C-matrix</a:t>
+            </a:r>
+          </a:p>
+          <a:p>
+            <a:r>
+              <a:rPr lang="en-US" dirty="0"/>
+              <a:t>M</a:t>
+            </a:r>
+            <a:r>
+              <a:rPr lang="en-US" dirty="0" smtClean="0"/>
+              <a:t>aterial properties, cell architecture, and loading conditions are set in the input file</a:t>
+            </a:r>
+          </a:p>
+          <a:p>
+            <a:r>
+              <a:rPr lang="en-US" dirty="0" smtClean="0"/>
+              <a:t>Materials are linear elastic and do not have </a:t>
+            </a:r>
+            <a:r>
+              <a:rPr lang="en-US" dirty="0" smtClean="0"/>
+              <a:t>failure conditions</a:t>
+            </a:r>
+            <a:endParaRPr lang="en-US" dirty="0"/>
+          </a:p>
+        </p:txBody>
+      </p:sp>
+      <p:sp>
+        <p:nvSpPr>
+          <p:cNvPr id="6" name="TextBox 5"/>
+          <p:cNvSpPr txBox="1"/>
+          <p:nvPr/>
+        </p:nvSpPr>
+        <p:spPr>
+          <a:xfrm>
+            <a:off x="7780698" y="456247"/>
+            <a:ext cx="3921307" cy="6401753"/>
+          </a:xfrm>
+          <a:prstGeom prst="rect">
+            <a:avLst/>
+          </a:prstGeom>
+          <a:noFill/>
+        </p:spPr>
+        <p:txBody>
+          <a:bodyPr wrap="square" rtlCol="0">
+            <a:spAutoFit/>
+          </a:bodyPr>
+          <a:lstStyle/>
+          <a:p>
+            <a:r>
+              <a:rPr lang="en-US" sz="1400" dirty="0">
+                <a:latin typeface="Courier New" panose="02070309020205020404" pitchFamily="49" charset="0"/>
+              </a:rPr>
+              <a:t>% MOC Input: Hex_0.5_01_AS.moci</a:t>
+            </a:r>
+          </a:p>
+          <a:p>
+            <a:r>
+              <a:rPr lang="en-US" sz="1400" dirty="0">
+                <a:latin typeface="Courier New" panose="02070309020205020404" pitchFamily="49" charset="0"/>
+              </a:rPr>
+              <a:t>% Created: 11-Jul-2014 11:48:03</a:t>
+            </a:r>
+          </a:p>
+          <a:p>
+            <a:r>
+              <a:rPr lang="en-US" sz="1400" dirty="0">
+                <a:latin typeface="Courier New" panose="02070309020205020404" pitchFamily="49" charset="0"/>
+              </a:rPr>
+              <a:t>%</a:t>
+            </a:r>
+          </a:p>
+          <a:p>
+            <a:r>
+              <a:rPr lang="en-US" sz="1400" dirty="0">
+                <a:latin typeface="Courier New" panose="02070309020205020404" pitchFamily="49" charset="0"/>
+              </a:rPr>
+              <a:t>*CONSTITUENTS</a:t>
+            </a:r>
+          </a:p>
+          <a:p>
+            <a:r>
+              <a:rPr lang="en-US" sz="1400" dirty="0">
+                <a:latin typeface="Courier New" panose="02070309020205020404" pitchFamily="49" charset="0"/>
+              </a:rPr>
+              <a:t>NMATS=2</a:t>
+            </a:r>
+          </a:p>
+          <a:p>
+            <a:r>
+              <a:rPr lang="en-US" sz="1400" dirty="0">
+                <a:latin typeface="Courier New" panose="02070309020205020404" pitchFamily="49" charset="0"/>
+              </a:rPr>
+              <a:t>MAT=1,CMOD=1</a:t>
+            </a:r>
+          </a:p>
+          <a:p>
+            <a:r>
+              <a:rPr lang="en-US" sz="1400" dirty="0">
+                <a:latin typeface="Courier New" panose="02070309020205020404" pitchFamily="49" charset="0"/>
+              </a:rPr>
+              <a:t>EA=2.510e+05</a:t>
+            </a:r>
+          </a:p>
+          <a:p>
+            <a:r>
+              <a:rPr lang="en-US" sz="1400" dirty="0">
+                <a:latin typeface="Courier New" panose="02070309020205020404" pitchFamily="49" charset="0"/>
+              </a:rPr>
+              <a:t>ET=4.040e+04</a:t>
+            </a:r>
+          </a:p>
+          <a:p>
+            <a:r>
+              <a:rPr lang="en-US" sz="1400" dirty="0">
+                <a:latin typeface="Courier New" panose="02070309020205020404" pitchFamily="49" charset="0"/>
+              </a:rPr>
+              <a:t>NUA=0.256</a:t>
+            </a:r>
+          </a:p>
+          <a:p>
+            <a:r>
+              <a:rPr lang="en-US" sz="1400" dirty="0">
+                <a:latin typeface="Courier New" panose="02070309020205020404" pitchFamily="49" charset="0"/>
+              </a:rPr>
+              <a:t>NUT=0.321</a:t>
+            </a:r>
+          </a:p>
+          <a:p>
+            <a:r>
+              <a:rPr lang="en-US" sz="1400" dirty="0">
+                <a:latin typeface="Courier New" panose="02070309020205020404" pitchFamily="49" charset="0"/>
+              </a:rPr>
+              <a:t>GA=1.608e+04</a:t>
+            </a:r>
+          </a:p>
+          <a:p>
+            <a:r>
+              <a:rPr lang="en-US" sz="1400" dirty="0">
+                <a:latin typeface="Courier New" panose="02070309020205020404" pitchFamily="49" charset="0"/>
+              </a:rPr>
+              <a:t>GT=3.070e+04</a:t>
+            </a:r>
+          </a:p>
+          <a:p>
+            <a:r>
+              <a:rPr lang="en-US" sz="1400" dirty="0">
+                <a:latin typeface="Courier New" panose="02070309020205020404" pitchFamily="49" charset="0"/>
+              </a:rPr>
+              <a:t>%</a:t>
+            </a:r>
+          </a:p>
+          <a:p>
+            <a:r>
+              <a:rPr lang="en-US" sz="1400" dirty="0">
+                <a:latin typeface="Courier New" panose="02070309020205020404" pitchFamily="49" charset="0"/>
+              </a:rPr>
+              <a:t>MAT=2,CMOD=2</a:t>
+            </a:r>
+          </a:p>
+          <a:p>
+            <a:r>
+              <a:rPr lang="en-US" sz="1400" dirty="0">
+                <a:latin typeface="Courier New" panose="02070309020205020404" pitchFamily="49" charset="0"/>
+              </a:rPr>
+              <a:t>E=3.310e+03</a:t>
+            </a:r>
+          </a:p>
+          <a:p>
+            <a:r>
+              <a:rPr lang="en-US" sz="1400" dirty="0">
+                <a:latin typeface="Courier New" panose="02070309020205020404" pitchFamily="49" charset="0"/>
+              </a:rPr>
+              <a:t>NU=0.318</a:t>
+            </a:r>
+          </a:p>
+          <a:p>
+            <a:r>
+              <a:rPr lang="en-US" sz="1400" dirty="0">
+                <a:latin typeface="Courier New" panose="02070309020205020404" pitchFamily="49" charset="0"/>
+              </a:rPr>
+              <a:t>%</a:t>
+            </a:r>
+          </a:p>
+          <a:p>
+            <a:r>
+              <a:rPr lang="en-US" sz="1400" dirty="0">
+                <a:latin typeface="Courier New" panose="02070309020205020404" pitchFamily="49" charset="0"/>
+              </a:rPr>
+              <a:t>*CELL</a:t>
+            </a:r>
+          </a:p>
+          <a:p>
+            <a:r>
+              <a:rPr lang="en-US" sz="1400" dirty="0">
+                <a:latin typeface="Courier New" panose="02070309020205020404" pitchFamily="49" charset="0"/>
+              </a:rPr>
+              <a:t>AMOD=3</a:t>
+            </a:r>
+          </a:p>
+          <a:p>
+            <a:r>
+              <a:rPr lang="en-US" sz="1400" dirty="0">
+                <a:latin typeface="Courier New" panose="02070309020205020404" pitchFamily="49" charset="0"/>
+              </a:rPr>
+              <a:t>VF=0.500</a:t>
+            </a:r>
+          </a:p>
+          <a:p>
+            <a:r>
+              <a:rPr lang="en-US" sz="1400" dirty="0">
+                <a:latin typeface="Courier New" panose="02070309020205020404" pitchFamily="49" charset="0"/>
+              </a:rPr>
+              <a:t>DF=5.000e-03</a:t>
+            </a:r>
+          </a:p>
+          <a:p>
+            <a:r>
+              <a:rPr lang="en-US" sz="1400" dirty="0">
+                <a:latin typeface="Courier New" panose="02070309020205020404" pitchFamily="49" charset="0"/>
+              </a:rPr>
+              <a:t>%</a:t>
+            </a:r>
+          </a:p>
+          <a:p>
+            <a:r>
+              <a:rPr lang="en-US" sz="1400" dirty="0">
+                <a:latin typeface="Courier New" panose="02070309020205020404" pitchFamily="49" charset="0"/>
+              </a:rPr>
+              <a:t>*LOADING</a:t>
+            </a:r>
+          </a:p>
+          <a:p>
+            <a:r>
+              <a:rPr lang="en-US" sz="1400" dirty="0">
+                <a:latin typeface="Courier New" panose="02070309020205020404" pitchFamily="49" charset="0"/>
+              </a:rPr>
+              <a:t>LMOD=1</a:t>
+            </a:r>
+          </a:p>
+          <a:p>
+            <a:r>
+              <a:rPr lang="en-US" sz="1400" dirty="0">
+                <a:latin typeface="Courier New" panose="02070309020205020404" pitchFamily="49" charset="0"/>
+              </a:rPr>
+              <a:t>NL=1</a:t>
+            </a:r>
+          </a:p>
+          <a:p>
+            <a:r>
+              <a:rPr lang="en-US" sz="1400" dirty="0">
+                <a:latin typeface="Courier New" panose="02070309020205020404" pitchFamily="49" charset="0"/>
+              </a:rPr>
+              <a:t>L=0.00100,</a:t>
+            </a:r>
+          </a:p>
+          <a:p>
+            <a:r>
+              <a:rPr lang="en-US" sz="1400" dirty="0" smtClean="0">
+                <a:latin typeface="Courier New" panose="02070309020205020404" pitchFamily="49" charset="0"/>
+              </a:rPr>
+              <a:t>%</a:t>
+            </a:r>
+            <a:endParaRPr lang="en-US" sz="1400" dirty="0">
+              <a:latin typeface="Courier New" panose="02070309020205020404" pitchFamily="49" charset="0"/>
+            </a:endParaRPr>
+          </a:p>
+          <a:p>
+            <a:r>
+              <a:rPr lang="en-US" sz="1400" dirty="0">
+                <a:latin typeface="Courier New" panose="02070309020205020404" pitchFamily="49" charset="0"/>
+              </a:rPr>
+              <a:t>*END</a:t>
+            </a:r>
+            <a:endParaRPr lang="en-US" sz="1400" dirty="0"/>
+          </a:p>
+          <a:p>
+            <a:endParaRPr lang="en-US" dirty="0"/>
+          </a:p>
+        </p:txBody>
+      </p:sp>
+    </p:spTree>
+    <p:extLst>
+      <p:ext uri="{BB962C8B-B14F-4D97-AF65-F5344CB8AC3E}">
+        <p14:creationId xmlns:p14="http://schemas.microsoft.com/office/powerpoint/2010/main" val="1229267926"/>
+      </p:ext>
+    </p:extLst>
+  </p:cSld>
+  <p:clrMapOvr>
+    <a:masterClrMapping/>
+  </p:clrMapOvr>
+</p:sld>
+</file>
+
+<file path=ppt/slides/slide5.xml><?xml version="1.0" encoding="utf-8"?>
+<p:sld xmlns:a="http://schemas.openxmlformats.org/drawingml/2006/main" xmlns:r="http://schemas.openxmlformats.org/officeDocument/2006/relationships" xmlns:p="http://schemas.openxmlformats.org/presentationml/2006/main">
+  <p:cSld>
+    <p:spTree>
+      <p:nvGrpSpPr>
+        <p:cNvPr id="1" name=""/>
+        <p:cNvGrpSpPr/>
+        <p:nvPr/>
+      </p:nvGrpSpPr>
+      <p:grpSpPr>
+        <a:xfrm>
+          <a:off x="0" y="0"/>
+          <a:ext cx="0" cy="0"/>
+          <a:chOff x="0" y="0"/>
+          <a:chExt cx="0" cy="0"/>
+        </a:xfrm>
+      </p:grpSpPr>
+      <p:sp>
+        <p:nvSpPr>
+          <p:cNvPr id="2" name="Title 1"/>
+          <p:cNvSpPr>
+            <a:spLocks noGrp="1"/>
+          </p:cNvSpPr>
+          <p:nvPr>
+            <p:ph type="title"/>
+          </p:nvPr>
+        </p:nvSpPr>
+        <p:spPr/>
+        <p:txBody>
+          <a:bodyPr/>
+          <a:lstStyle/>
+          <a:p>
+            <a:r>
+              <a:rPr lang="en-US" dirty="0" smtClean="0"/>
+              <a:t>Predefined Architectures</a:t>
+            </a:r>
+            <a:endParaRPr lang="en-US" dirty="0"/>
+          </a:p>
+        </p:txBody>
+      </p:sp>
+      <p:pic>
+        <p:nvPicPr>
+          <p:cNvPr id="5" name="Picture 4"/>
+          <p:cNvPicPr>
+            <a:picLocks noChangeAspect="1"/>
+          </p:cNvPicPr>
+          <p:nvPr/>
+        </p:nvPicPr>
+        <p:blipFill rotWithShape="1">
+          <a:blip r:embed="rId2">
+            <a:extLst>
+              <a:ext uri="{28A0092B-C50C-407E-A947-70E740481C1C}">
+                <a14:useLocalDpi xmlns:a14="http://schemas.microsoft.com/office/drawing/2010/main" val="0"/>
+              </a:ext>
+            </a:extLst>
+          </a:blip>
+          <a:srcRect l="20523" t="6953" r="17267" b="10100"/>
+          <a:stretch/>
+        </p:blipFill>
+        <p:spPr>
+          <a:xfrm>
+            <a:off x="2996588" y="1690688"/>
+            <a:ext cx="2038121" cy="2038120"/>
+          </a:xfrm>
+          <a:prstGeom prst="rect">
+            <a:avLst/>
+          </a:prstGeom>
+        </p:spPr>
+      </p:pic>
+      <p:pic>
+        <p:nvPicPr>
+          <p:cNvPr id="6" name="Picture 5"/>
+          <p:cNvPicPr>
+            <a:picLocks noChangeAspect="1"/>
+          </p:cNvPicPr>
+          <p:nvPr/>
+        </p:nvPicPr>
+        <p:blipFill rotWithShape="1">
+          <a:blip r:embed="rId3">
+            <a:extLst>
+              <a:ext uri="{28A0092B-C50C-407E-A947-70E740481C1C}">
+                <a14:useLocalDpi xmlns:a14="http://schemas.microsoft.com/office/drawing/2010/main" val="0"/>
+              </a:ext>
+            </a:extLst>
+          </a:blip>
+          <a:srcRect l="12854" t="17785" r="9283" b="21158"/>
+          <a:stretch/>
+        </p:blipFill>
+        <p:spPr>
+          <a:xfrm>
+            <a:off x="7549208" y="4131326"/>
+            <a:ext cx="3804592" cy="2230917"/>
+          </a:xfrm>
+          <a:prstGeom prst="rect">
+            <a:avLst/>
+          </a:prstGeom>
+        </p:spPr>
+      </p:pic>
+      <p:pic>
+        <p:nvPicPr>
+          <p:cNvPr id="7" name="Picture 6"/>
+          <p:cNvPicPr>
+            <a:picLocks noChangeAspect="1"/>
+          </p:cNvPicPr>
+          <p:nvPr/>
+        </p:nvPicPr>
+        <p:blipFill rotWithShape="1">
+          <a:blip r:embed="rId4">
+            <a:extLst>
+              <a:ext uri="{28A0092B-C50C-407E-A947-70E740481C1C}">
+                <a14:useLocalDpi xmlns:a14="http://schemas.microsoft.com/office/drawing/2010/main" val="0"/>
+              </a:ext>
+            </a:extLst>
+          </a:blip>
+          <a:srcRect l="12463" t="17802" r="8548" b="21257"/>
+          <a:stretch/>
+        </p:blipFill>
+        <p:spPr>
+          <a:xfrm>
+            <a:off x="2996588" y="4120558"/>
+            <a:ext cx="3866921" cy="2230916"/>
+          </a:xfrm>
+          <a:prstGeom prst="rect">
+            <a:avLst/>
+          </a:prstGeom>
+        </p:spPr>
+      </p:pic>
+      <p:pic>
+        <p:nvPicPr>
+          <p:cNvPr id="8" name="Picture 7"/>
+          <p:cNvPicPr>
+            <a:picLocks noChangeAspect="1"/>
+          </p:cNvPicPr>
+          <p:nvPr/>
+        </p:nvPicPr>
+        <p:blipFill rotWithShape="1">
+          <a:blip r:embed="rId5">
+            <a:extLst>
+              <a:ext uri="{28A0092B-C50C-407E-A947-70E740481C1C}">
+                <a14:useLocalDpi xmlns:a14="http://schemas.microsoft.com/office/drawing/2010/main" val="0"/>
+              </a:ext>
+            </a:extLst>
+          </a:blip>
+          <a:srcRect l="21012" t="7264" r="16962" b="10127"/>
+          <a:stretch/>
+        </p:blipFill>
+        <p:spPr>
+          <a:xfrm>
+            <a:off x="9307326" y="1690688"/>
+            <a:ext cx="2046474" cy="2038120"/>
+          </a:xfrm>
+          <a:prstGeom prst="rect">
+            <a:avLst/>
+          </a:prstGeom>
+        </p:spPr>
+      </p:pic>
+      <p:pic>
+        <p:nvPicPr>
+          <p:cNvPr id="9" name="Picture 8"/>
+          <p:cNvPicPr>
+            <a:picLocks noChangeAspect="1"/>
+          </p:cNvPicPr>
+          <p:nvPr/>
+        </p:nvPicPr>
+        <p:blipFill rotWithShape="1">
+          <a:blip r:embed="rId6">
+            <a:extLst>
+              <a:ext uri="{28A0092B-C50C-407E-A947-70E740481C1C}">
+                <a14:useLocalDpi xmlns:a14="http://schemas.microsoft.com/office/drawing/2010/main" val="0"/>
+              </a:ext>
+            </a:extLst>
+          </a:blip>
+          <a:srcRect l="20508" t="6861" r="16961" b="10192"/>
+          <a:stretch/>
+        </p:blipFill>
+        <p:spPr>
+          <a:xfrm>
+            <a:off x="6143638" y="1690688"/>
+            <a:ext cx="2054758" cy="2038120"/>
+          </a:xfrm>
+          <a:prstGeom prst="rect">
+            <a:avLst/>
+          </a:prstGeom>
+        </p:spPr>
+      </p:pic>
+      <p:grpSp>
+        <p:nvGrpSpPr>
+          <p:cNvPr id="16" name="Group 15"/>
+          <p:cNvGrpSpPr/>
+          <p:nvPr/>
+        </p:nvGrpSpPr>
+        <p:grpSpPr>
+          <a:xfrm>
+            <a:off x="7858278" y="1071975"/>
+            <a:ext cx="1752975" cy="3356806"/>
+            <a:chOff x="6443574" y="1231720"/>
+            <a:chExt cx="1752975" cy="3356806"/>
+          </a:xfrm>
+        </p:grpSpPr>
+        <p:cxnSp>
+          <p:nvCxnSpPr>
+            <p:cNvPr id="11" name="Straight Arrow Connector 10"/>
+            <p:cNvCxnSpPr/>
+            <p:nvPr/>
+          </p:nvCxnSpPr>
+          <p:spPr>
+            <a:xfrm>
+              <a:off x="7597094" y="1536853"/>
+              <a:ext cx="599455" cy="886858"/>
+            </a:xfrm>
+            <a:prstGeom prst="straightConnector1">
+              <a:avLst/>
+            </a:prstGeom>
+            <a:ln w="57150">
+              <a:tailEnd type="triangle"/>
+            </a:ln>
+          </p:spPr>
+          <p:style>
+            <a:lnRef idx="3">
+              <a:schemeClr val="accent2"/>
+            </a:lnRef>
+            <a:fillRef idx="0">
+              <a:schemeClr val="accent2"/>
+            </a:fillRef>
+            <a:effectRef idx="2">
+              <a:schemeClr val="accent2"/>
+            </a:effectRef>
+            <a:fontRef idx="minor">
+              <a:schemeClr val="tx1"/>
+            </a:fontRef>
+          </p:style>
+        </p:cxnSp>
+        <p:cxnSp>
+          <p:nvCxnSpPr>
+            <p:cNvPr id="12" name="Straight Arrow Connector 11"/>
+            <p:cNvCxnSpPr/>
+            <p:nvPr/>
+          </p:nvCxnSpPr>
+          <p:spPr>
+            <a:xfrm>
+              <a:off x="7597094" y="1536853"/>
+              <a:ext cx="213977" cy="3051673"/>
+            </a:xfrm>
+            <a:prstGeom prst="straightConnector1">
+              <a:avLst/>
+            </a:prstGeom>
+            <a:ln w="57150">
+              <a:tailEnd type="triangle"/>
+            </a:ln>
+          </p:spPr>
+          <p:style>
+            <a:lnRef idx="3">
+              <a:schemeClr val="accent2"/>
+            </a:lnRef>
+            <a:fillRef idx="0">
+              <a:schemeClr val="accent2"/>
+            </a:fillRef>
+            <a:effectRef idx="2">
+              <a:schemeClr val="accent2"/>
+            </a:effectRef>
+            <a:fontRef idx="minor">
+              <a:schemeClr val="tx1"/>
+            </a:fontRef>
+          </p:style>
+        </p:cxnSp>
+        <p:sp>
+          <p:nvSpPr>
+            <p:cNvPr id="15" name="TextBox 14"/>
+            <p:cNvSpPr txBox="1"/>
+            <p:nvPr/>
+          </p:nvSpPr>
+          <p:spPr>
+            <a:xfrm>
+              <a:off x="6443574" y="1231720"/>
+              <a:ext cx="1244906" cy="369332"/>
+            </a:xfrm>
+            <a:prstGeom prst="rect">
+              <a:avLst/>
+            </a:prstGeom>
+            <a:noFill/>
+          </p:spPr>
+          <p:txBody>
+            <a:bodyPr wrap="square" rtlCol="0">
+              <a:spAutoFit/>
+            </a:bodyPr>
+            <a:lstStyle/>
+            <a:p>
+              <a:r>
+                <a:rPr lang="en-US" b="1" dirty="0" smtClean="0">
+                  <a:solidFill>
+                    <a:schemeClr val="accent2"/>
+                  </a:solidFill>
+                </a:rPr>
+                <a:t>Interphase</a:t>
+              </a:r>
+              <a:endParaRPr lang="en-US" b="1" dirty="0">
+                <a:solidFill>
+                  <a:schemeClr val="accent2"/>
+                </a:solidFill>
+              </a:endParaRPr>
+            </a:p>
+          </p:txBody>
+        </p:sp>
+      </p:grpSp>
+      <p:sp>
+        <p:nvSpPr>
+          <p:cNvPr id="21" name="TextBox 20"/>
+          <p:cNvSpPr txBox="1"/>
+          <p:nvPr/>
+        </p:nvSpPr>
+        <p:spPr>
+          <a:xfrm>
+            <a:off x="271648" y="3267143"/>
+            <a:ext cx="2588964" cy="923330"/>
+          </a:xfrm>
+          <a:prstGeom prst="rect">
+            <a:avLst/>
+          </a:prstGeom>
+          <a:noFill/>
+        </p:spPr>
+        <p:txBody>
+          <a:bodyPr wrap="square" rtlCol="0">
+            <a:spAutoFit/>
+          </a:bodyPr>
+          <a:lstStyle/>
+          <a:p>
+            <a:r>
+              <a:rPr lang="en-US" dirty="0" smtClean="0"/>
+              <a:t>Variable volume fraction, fiber diameter, and interphase thickness</a:t>
+            </a:r>
+            <a:endParaRPr lang="en-US" dirty="0"/>
+          </a:p>
+        </p:txBody>
+      </p:sp>
+    </p:spTree>
+    <p:extLst>
+      <p:ext uri="{BB962C8B-B14F-4D97-AF65-F5344CB8AC3E}">
+        <p14:creationId xmlns:p14="http://schemas.microsoft.com/office/powerpoint/2010/main" val="426553805"/>
+      </p:ext>
+    </p:extLst>
+  </p:cSld>
+  <p:clrMapOvr>
+    <a:masterClrMapping/>
+  </p:clrMapOvr>
+</p:sld>
+</file>
+
+<file path=ppt/slides/slide6.xml><?xml version="1.0" encoding="utf-8"?>
+<p:sld xmlns:a="http://schemas.openxmlformats.org/drawingml/2006/main" xmlns:r="http://schemas.openxmlformats.org/officeDocument/2006/relationships" xmlns:p="http://schemas.openxmlformats.org/presentationml/2006/main">
+  <p:cSld>
+    <p:spTree>
+      <p:nvGrpSpPr>
+        <p:cNvPr id="1" name=""/>
+        <p:cNvGrpSpPr/>
+        <p:nvPr/>
+      </p:nvGrpSpPr>
+      <p:grpSpPr>
+        <a:xfrm>
+          <a:off x="0" y="0"/>
+          <a:ext cx="0" cy="0"/>
+          <a:chOff x="0" y="0"/>
+          <a:chExt cx="0" cy="0"/>
+        </a:xfrm>
+      </p:grpSpPr>
+      <p:sp>
+        <p:nvSpPr>
+          <p:cNvPr id="2" name="Title 1"/>
+          <p:cNvSpPr>
+            <a:spLocks noGrp="1"/>
+          </p:cNvSpPr>
+          <p:nvPr>
+            <p:ph type="title"/>
+          </p:nvPr>
+        </p:nvSpPr>
+        <p:spPr/>
+        <p:txBody>
+          <a:bodyPr/>
+          <a:lstStyle/>
+          <a:p>
+            <a:endParaRPr lang="en-US" dirty="0"/>
+          </a:p>
+        </p:txBody>
+      </p:sp>
+      <p:sp>
+        <p:nvSpPr>
+          <p:cNvPr id="3" name="Content Placeholder 2"/>
+          <p:cNvSpPr>
+            <a:spLocks noGrp="1"/>
+          </p:cNvSpPr>
+          <p:nvPr>
+            <p:ph sz="half" idx="1"/>
+          </p:nvPr>
+        </p:nvSpPr>
+        <p:spPr/>
+        <p:txBody>
+          <a:bodyPr/>
+          <a:lstStyle/>
+          <a:p>
+            <a:endParaRPr lang="en-US"/>
+          </a:p>
+        </p:txBody>
+      </p:sp>
+      <p:sp>
+        <p:nvSpPr>
+          <p:cNvPr id="4" name="Content Placeholder 3"/>
+          <p:cNvSpPr>
+            <a:spLocks noGrp="1"/>
+          </p:cNvSpPr>
+          <p:nvPr>
+            <p:ph sz="half" idx="2"/>
+          </p:nvPr>
+        </p:nvSpPr>
+        <p:spPr/>
+        <p:txBody>
+          <a:bodyPr/>
+          <a:lstStyle/>
+          <a:p>
+            <a:endParaRPr lang="en-US"/>
+          </a:p>
+        </p:txBody>
+      </p:sp>
+    </p:spTree>
+    <p:extLst>
+      <p:ext uri="{BB962C8B-B14F-4D97-AF65-F5344CB8AC3E}">
+        <p14:creationId xmlns:p14="http://schemas.microsoft.com/office/powerpoint/2010/main" val="3331768039"/>
       </p:ext>
     </p:extLst>
   </p:cSld>
@@ -3583,4 +4560,265 @@
     </a:ext>
   </a:extLst>
 </a:theme>
+</file>
+
+<file path=ppt/theme/theme2.xml><?xml version="1.0" encoding="utf-8"?>
+<a:theme xmlns:a="http://schemas.openxmlformats.org/drawingml/2006/main" name="Office Theme">
+  <a:themeElements>
+    <a:clrScheme name="Office">
+      <a:dk1>
+        <a:sysClr val="windowText" lastClr="000000"/>
+      </a:dk1>
+      <a:lt1>
+        <a:sysClr val="window" lastClr="FFFFFF"/>
+      </a:lt1>
+      <a:dk2>
+        <a:srgbClr val="44546A"/>
+      </a:dk2>
+      <a:lt2>
+        <a:srgbClr val="E7E6E6"/>
+      </a:lt2>
+      <a:accent1>
+        <a:srgbClr val="5B9BD5"/>
+      </a:accent1>
+      <a:accent2>
+        <a:srgbClr val="ED7D31"/>
+      </a:accent2>
+      <a:accent3>
+        <a:srgbClr val="A5A5A5"/>
+      </a:accent3>
+      <a:accent4>
+        <a:srgbClr val="FFC000"/>
+      </a:accent4>
+      <a:accent5>
+        <a:srgbClr val="4472C4"/>
+      </a:accent5>
+      <a:accent6>
+        <a:srgbClr val="70AD47"/>
+      </a:accent6>
+      <a:hlink>
+        <a:srgbClr val="0563C1"/>
+      </a:hlink>
+      <a:folHlink>
+        <a:srgbClr val="954F72"/>
+      </a:folHlink>
+    </a:clrScheme>
+    <a:fontScheme name="Office">
+      <a:majorFont>
+        <a:latin typeface="Calibri Light" panose="020F0302020204030204"/>
+        <a:ea typeface=""/>
+        <a:cs typeface=""/>
+        <a:font script="Jpan" typeface="ＭＳ Ｐゴシック"/>
+        <a:font script="Hang" typeface="맑은 고딕"/>
+        <a:font script="Hans" typeface="宋体"/>
+        <a:font script="Hant" typeface="新細明體"/>
+        <a:font script="Arab" typeface="Times New Roman"/>
+        <a:font script="Hebr" typeface="Times New Roman"/>
+        <a:font script="Thai" typeface="Angsana New"/>
+        <a:font script="Ethi" typeface="Nyala"/>
+        <a:font script="Beng" typeface="Vrinda"/>
+        <a:font script="Gujr" typeface="Shruti"/>
+        <a:font script="Khmr" typeface="MoolBoran"/>
+        <a:font script="Knda" typeface="Tunga"/>
+        <a:font script="Guru" typeface="Raavi"/>
+        <a:font script="Cans" typeface="Euphemia"/>
+        <a:font script="Cher" typeface="Plantagenet Cherokee"/>
+        <a:font script="Yiii" typeface="Microsoft Yi Baiti"/>
+        <a:font script="Tibt" typeface="Microsoft Himalaya"/>
+        <a:font script="Thaa" typeface="MV Boli"/>
+        <a:font script="Deva" typeface="Mangal"/>
+        <a:font script="Telu" typeface="Gautami"/>
+        <a:font script="Taml" typeface="Latha"/>
+        <a:font script="Syrc" typeface="Estrangelo Edessa"/>
+        <a:font script="Orya" typeface="Kalinga"/>
+        <a:font script="Mlym" typeface="Kartika"/>
+        <a:font script="Laoo" typeface="DokChampa"/>
+        <a:font script="Sinh" typeface="Iskoola Pota"/>
+        <a:font script="Mong" typeface="Mongolian Baiti"/>
+        <a:font script="Viet" typeface="Times New Roman"/>
+        <a:font script="Uigh" typeface="Microsoft Uighur"/>
+        <a:font script="Geor" typeface="Sylfaen"/>
+      </a:majorFont>
+      <a:minorFont>
+        <a:latin typeface="Calibri" panose="020F0502020204030204"/>
+        <a:ea typeface=""/>
+        <a:cs typeface=""/>
+        <a:font script="Jpan" typeface="ＭＳ Ｐゴシック"/>
+        <a:font script="Hang" typeface="맑은 고딕"/>
+        <a:font script="Hans" typeface="宋体"/>
+        <a:font script="Hant" typeface="新細明體"/>
+        <a:font script="Arab" typeface="Arial"/>
+        <a:font script="Hebr" typeface="Arial"/>
+        <a:font script="Thai" typeface="Cordia New"/>
+        <a:font script="Ethi" typeface="Nyala"/>
+        <a:font script="Beng" typeface="Vrinda"/>
+        <a:font script="Gujr" typeface="Shruti"/>
+        <a:font script="Khmr" typeface="DaunPenh"/>
+        <a:font script="Knda" typeface="Tunga"/>
+        <a:font script="Guru" typeface="Raavi"/>
+        <a:font script="Cans" typeface="Euphemia"/>
+        <a:font script="Cher" typeface="Plantagenet Cherokee"/>
+        <a:font script="Yiii" typeface="Microsoft Yi Baiti"/>
+        <a:font script="Tibt" typeface="Microsoft Himalaya"/>
+        <a:font script="Thaa" typeface="MV Boli"/>
+        <a:font script="Deva" typeface="Mangal"/>
+        <a:font script="Telu" typeface="Gautami"/>
+        <a:font script="Taml" typeface="Latha"/>
+        <a:font script="Syrc" typeface="Estrangelo Edessa"/>
+        <a:font script="Orya" typeface="Kalinga"/>
+        <a:font script="Mlym" typeface="Kartika"/>
+        <a:font script="Laoo" typeface="DokChampa"/>
+        <a:font script="Sinh" typeface="Iskoola Pota"/>
+        <a:font script="Mong" typeface="Mongolian Baiti"/>
+        <a:font script="Viet" typeface="Arial"/>
+        <a:font script="Uigh" typeface="Microsoft Uighur"/>
+        <a:font script="Geor" typeface="Sylfaen"/>
+      </a:minorFont>
+    </a:fontScheme>
+    <a:fmtScheme name="Office">
+      <a:fillStyleLst>
+        <a:solidFill>
+          <a:schemeClr val="phClr"/>
+        </a:solidFill>
+        <a:gradFill rotWithShape="1">
+          <a:gsLst>
+            <a:gs pos="0">
+              <a:schemeClr val="phClr">
+                <a:lumMod val="110000"/>
+                <a:satMod val="105000"/>
+                <a:tint val="67000"/>
+              </a:schemeClr>
+            </a:gs>
+            <a:gs pos="50000">
+              <a:schemeClr val="phClr">
+                <a:lumMod val="105000"/>
+                <a:satMod val="103000"/>
+                <a:tint val="73000"/>
+              </a:schemeClr>
+            </a:gs>
+            <a:gs pos="100000">
+              <a:schemeClr val="phClr">
+                <a:lumMod val="105000"/>
+                <a:satMod val="109000"/>
+                <a:tint val="81000"/>
+              </a:schemeClr>
+            </a:gs>
+          </a:gsLst>
+          <a:lin ang="5400000" scaled="0"/>
+        </a:gradFill>
+        <a:gradFill rotWithShape="1">
+          <a:gsLst>
+            <a:gs pos="0">
+              <a:schemeClr val="phClr">
+                <a:satMod val="103000"/>
+                <a:lumMod val="102000"/>
+                <a:tint val="94000"/>
+              </a:schemeClr>
+            </a:gs>
+            <a:gs pos="50000">
+              <a:schemeClr val="phClr">
+                <a:satMod val="110000"/>
+                <a:lumMod val="100000"/>
+                <a:shade val="100000"/>
+              </a:schemeClr>
+            </a:gs>
+            <a:gs pos="100000">
+              <a:schemeClr val="phClr">
+                <a:lumMod val="99000"/>
+                <a:satMod val="120000"/>
+                <a:shade val="78000"/>
+              </a:schemeClr>
+            </a:gs>
+          </a:gsLst>
+          <a:lin ang="5400000" scaled="0"/>
+        </a:gradFill>
+      </a:fillStyleLst>
+      <a:lnStyleLst>
+        <a:ln w="6350" cap="flat" cmpd="sng" algn="ctr">
+          <a:solidFill>
+            <a:schemeClr val="phClr"/>
+          </a:solidFill>
+          <a:prstDash val="solid"/>
+          <a:miter lim="800000"/>
+        </a:ln>
+        <a:ln w="12700" cap="flat" cmpd="sng" algn="ctr">
+          <a:solidFill>
+            <a:schemeClr val="phClr"/>
+          </a:solidFill>
+          <a:prstDash val="solid"/>
+          <a:miter lim="800000"/>
+        </a:ln>
+        <a:ln w="19050" cap="flat" cmpd="sng" algn="ctr">
+          <a:solidFill>
+            <a:schemeClr val="phClr"/>
+          </a:solidFill>
+          <a:prstDash val="solid"/>
+          <a:miter lim="800000"/>
+        </a:ln>
+      </a:lnStyleLst>
+      <a:effectStyleLst>
+        <a:effectStyle>
+          <a:effectLst/>
+        </a:effectStyle>
+        <a:effectStyle>
+          <a:effectLst/>
+        </a:effectStyle>
+        <a:effectStyle>
+          <a:effectLst>
+            <a:outerShdw blurRad="57150" dist="19050" dir="5400000" algn="ctr" rotWithShape="0">
+              <a:srgbClr val="000000">
+                <a:alpha val="63000"/>
+              </a:srgbClr>
+            </a:outerShdw>
+          </a:effectLst>
+        </a:effectStyle>
+      </a:effectStyleLst>
+      <a:bgFillStyleLst>
+        <a:solidFill>
+          <a:schemeClr val="phClr"/>
+        </a:solidFill>
+        <a:solidFill>
+          <a:schemeClr val="phClr">
+            <a:tint val="95000"/>
+            <a:satMod val="170000"/>
+          </a:schemeClr>
+        </a:solidFill>
+        <a:gradFill rotWithShape="1">
+          <a:gsLst>
+            <a:gs pos="0">
+              <a:schemeClr val="phClr">
+                <a:tint val="93000"/>
+                <a:satMod val="150000"/>
+                <a:shade val="98000"/>
+                <a:lumMod val="102000"/>
+              </a:schemeClr>
+            </a:gs>
+            <a:gs pos="50000">
+              <a:schemeClr val="phClr">
+                <a:tint val="98000"/>
+                <a:satMod val="130000"/>
+                <a:shade val="90000"/>
+                <a:lumMod val="103000"/>
+              </a:schemeClr>
+            </a:gs>
+            <a:gs pos="100000">
+              <a:schemeClr val="phClr">
+                <a:shade val="63000"/>
+                <a:satMod val="120000"/>
+              </a:schemeClr>
+            </a:gs>
+          </a:gsLst>
+          <a:lin ang="5400000" scaled="0"/>
+        </a:gradFill>
+      </a:bgFillStyleLst>
+    </a:fmtScheme>
+  </a:themeElements>
+  <a:objectDefaults/>
+  <a:extraClrSchemeLst/>
+  <a:extLst>
+    <a:ext uri="{05A4C25C-085E-4340-85A3-A5531E510DB2}">
+      <thm15:themeFamily xmlns:thm15="http://schemas.microsoft.com/office/thememl/2012/main" name="Office Theme" id="{62F939B6-93AF-4DB8-9C6B-D6C7DFDC589F}" vid="{4A3C46E8-61CC-4603-A589-7422A47A8E4A}"/>
+    </a:ext>
+  </a:extLst>
+</a:theme>
 </file>
</xml_diff>

<commit_message>
added slides to the MOC powerpoint
</commit_message>
<xml_diff>
--- a/Generalized Method of Cells (08-01-2014).pptx
+++ b/Generalized Method of Cells (08-01-2014).pptx
@@ -5,7 +5,7 @@
     <p:sldMasterId id="2147483648" r:id="rId1"/>
   </p:sldMasterIdLst>
   <p:handoutMasterIdLst>
-    <p:handoutMasterId r:id="rId8"/>
+    <p:handoutMasterId r:id="rId9"/>
   </p:handoutMasterIdLst>
   <p:sldIdLst>
     <p:sldId id="256" r:id="rId2"/>
@@ -14,6 +14,7 @@
     <p:sldId id="259" r:id="rId5"/>
     <p:sldId id="260" r:id="rId6"/>
     <p:sldId id="261" r:id="rId7"/>
+    <p:sldId id="262" r:id="rId8"/>
   </p:sldIdLst>
   <p:sldSz cx="12192000" cy="6858000"/>
   <p:notesSz cx="6985000" cy="9283700"/>
@@ -114,7 +115,7 @@
   </p:defaultTextStyle>
   <p:extLst>
     <p:ext uri="{EFAFB233-063F-42B5-8137-9DF3F51BA10A}">
-      <p15:sldGuideLst xmlns:p15="http://schemas.microsoft.com/office/powerpoint/2012/main"/>
+      <p15:sldGuideLst xmlns:p15="http://schemas.microsoft.com/office/powerpoint/2012/main" xmlns=""/>
     </p:ext>
   </p:extLst>
 </p:presentation>
@@ -202,7 +203,7 @@
           <a:p>
             <a:fld id="{7B333BA5-51A3-40A0-B8B6-6449580A3234}" type="datetimeFigureOut">
               <a:rPr lang="en-US" smtClean="0"/>
-              <a:t>7/29/2014</a:t>
+              <a:t>7/31/2014</a:t>
             </a:fld>
             <a:endParaRPr lang="en-US"/>
           </a:p>
@@ -416,7 +417,7 @@
           <a:p>
             <a:fld id="{7BB2BC7A-0E1A-4CB9-A35A-811A5CB4BDAF}" type="datetimeFigureOut">
               <a:rPr lang="en-US" smtClean="0"/>
-              <a:t>7/29/2014</a:t>
+              <a:t>7/31/2014</a:t>
             </a:fld>
             <a:endParaRPr lang="en-US"/>
           </a:p>
@@ -586,7 +587,7 @@
           <a:p>
             <a:fld id="{7BB2BC7A-0E1A-4CB9-A35A-811A5CB4BDAF}" type="datetimeFigureOut">
               <a:rPr lang="en-US" smtClean="0"/>
-              <a:t>7/29/2014</a:t>
+              <a:t>7/31/2014</a:t>
             </a:fld>
             <a:endParaRPr lang="en-US"/>
           </a:p>
@@ -766,7 +767,7 @@
           <a:p>
             <a:fld id="{7BB2BC7A-0E1A-4CB9-A35A-811A5CB4BDAF}" type="datetimeFigureOut">
               <a:rPr lang="en-US" smtClean="0"/>
-              <a:t>7/29/2014</a:t>
+              <a:t>7/31/2014</a:t>
             </a:fld>
             <a:endParaRPr lang="en-US"/>
           </a:p>
@@ -936,7 +937,7 @@
           <a:p>
             <a:fld id="{7BB2BC7A-0E1A-4CB9-A35A-811A5CB4BDAF}" type="datetimeFigureOut">
               <a:rPr lang="en-US" smtClean="0"/>
-              <a:t>7/29/2014</a:t>
+              <a:t>7/31/2014</a:t>
             </a:fld>
             <a:endParaRPr lang="en-US"/>
           </a:p>
@@ -1182,7 +1183,7 @@
           <a:p>
             <a:fld id="{7BB2BC7A-0E1A-4CB9-A35A-811A5CB4BDAF}" type="datetimeFigureOut">
               <a:rPr lang="en-US" smtClean="0"/>
-              <a:t>7/29/2014</a:t>
+              <a:t>7/31/2014</a:t>
             </a:fld>
             <a:endParaRPr lang="en-US"/>
           </a:p>
@@ -1414,7 +1415,7 @@
           <a:p>
             <a:fld id="{7BB2BC7A-0E1A-4CB9-A35A-811A5CB4BDAF}" type="datetimeFigureOut">
               <a:rPr lang="en-US" smtClean="0"/>
-              <a:t>7/29/2014</a:t>
+              <a:t>7/31/2014</a:t>
             </a:fld>
             <a:endParaRPr lang="en-US"/>
           </a:p>
@@ -1781,7 +1782,7 @@
           <a:p>
             <a:fld id="{7BB2BC7A-0E1A-4CB9-A35A-811A5CB4BDAF}" type="datetimeFigureOut">
               <a:rPr lang="en-US" smtClean="0"/>
-              <a:t>7/29/2014</a:t>
+              <a:t>7/31/2014</a:t>
             </a:fld>
             <a:endParaRPr lang="en-US"/>
           </a:p>
@@ -1899,7 +1900,7 @@
           <a:p>
             <a:fld id="{7BB2BC7A-0E1A-4CB9-A35A-811A5CB4BDAF}" type="datetimeFigureOut">
               <a:rPr lang="en-US" smtClean="0"/>
-              <a:t>7/29/2014</a:t>
+              <a:t>7/31/2014</a:t>
             </a:fld>
             <a:endParaRPr lang="en-US"/>
           </a:p>
@@ -1994,7 +1995,7 @@
           <a:p>
             <a:fld id="{7BB2BC7A-0E1A-4CB9-A35A-811A5CB4BDAF}" type="datetimeFigureOut">
               <a:rPr lang="en-US" smtClean="0"/>
-              <a:t>7/29/2014</a:t>
+              <a:t>7/31/2014</a:t>
             </a:fld>
             <a:endParaRPr lang="en-US"/>
           </a:p>
@@ -2271,7 +2272,7 @@
           <a:p>
             <a:fld id="{7BB2BC7A-0E1A-4CB9-A35A-811A5CB4BDAF}" type="datetimeFigureOut">
               <a:rPr lang="en-US" smtClean="0"/>
-              <a:t>7/29/2014</a:t>
+              <a:t>7/31/2014</a:t>
             </a:fld>
             <a:endParaRPr lang="en-US"/>
           </a:p>
@@ -2524,7 +2525,7 @@
           <a:p>
             <a:fld id="{7BB2BC7A-0E1A-4CB9-A35A-811A5CB4BDAF}" type="datetimeFigureOut">
               <a:rPr lang="en-US" smtClean="0"/>
-              <a:t>7/29/2014</a:t>
+              <a:t>7/31/2014</a:t>
             </a:fld>
             <a:endParaRPr lang="en-US"/>
           </a:p>
@@ -2737,7 +2738,7 @@
           <a:p>
             <a:fld id="{7BB2BC7A-0E1A-4CB9-A35A-811A5CB4BDAF}" type="datetimeFigureOut">
               <a:rPr lang="en-US" smtClean="0"/>
-              <a:t>7/29/2014</a:t>
+              <a:t>7/31/2014</a:t>
             </a:fld>
             <a:endParaRPr lang="en-US"/>
           </a:p>
@@ -3590,11 +3591,7 @@
           <a:p>
             <a:r>
               <a:rPr lang="en-US" dirty="0" smtClean="0"/>
-              <a:t>Materials are linear elastic and do not have </a:t>
-            </a:r>
-            <a:r>
-              <a:rPr lang="en-US" dirty="0" smtClean="0"/>
-              <a:t>failure conditions</a:t>
+              <a:t>Materials are linear elastic and do not have failure conditions</a:t>
             </a:r>
             <a:endParaRPr lang="en-US" dirty="0"/>
           </a:p>
@@ -4246,45 +4243,250 @@
           <a:bodyPr/>
           <a:lstStyle/>
           <a:p>
+            <a:r>
+              <a:rPr lang="en-US" dirty="0" smtClean="0"/>
+              <a:t>Equations</a:t>
+            </a:r>
             <a:endParaRPr lang="en-US" dirty="0"/>
           </a:p>
         </p:txBody>
       </p:sp>
       <p:sp>
         <p:nvSpPr>
-          <p:cNvPr id="3" name="Content Placeholder 2"/>
-          <p:cNvSpPr>
-            <a:spLocks noGrp="1"/>
-          </p:cNvSpPr>
+          <p:cNvPr id="4" name="Content Placeholder 3"/>
+          <p:cNvSpPr>
+            <a:spLocks noGrp="1"/>
+          </p:cNvSpPr>
+          <p:nvPr>
+            <p:ph sz="half" idx="2"/>
+          </p:nvPr>
+        </p:nvSpPr>
+        <p:spPr/>
+        <p:txBody>
+          <a:bodyPr/>
+          <a:lstStyle/>
+          <a:p>
+            <a:r>
+              <a:rPr lang="en-US" dirty="0" smtClean="0"/>
+              <a:t>The average stress is equal to the applied strain multiplied by the stiffness matrix. </a:t>
+            </a:r>
+          </a:p>
+          <a:p>
+            <a:r>
+              <a:rPr lang="en-US" dirty="0" smtClean="0"/>
+              <a:t>The stiffness Coefficient in three dimensions is the volume of the RUC multiplied by the elastic stiffness of the RUC times the concentration tensor. </a:t>
+            </a:r>
+            <a:endParaRPr lang="en-US" dirty="0"/>
+          </a:p>
+        </p:txBody>
+      </p:sp>
+      <p:pic>
+        <p:nvPicPr>
+          <p:cNvPr id="2050" name="Picture 2"/>
+          <p:cNvPicPr>
+            <a:picLocks noGrp="1" noChangeAspect="1" noChangeArrowheads="1"/>
+          </p:cNvPicPr>
           <p:nvPr>
             <p:ph sz="half" idx="1"/>
           </p:nvPr>
-        </p:nvSpPr>
-        <p:spPr/>
-        <p:txBody>
-          <a:bodyPr/>
-          <a:lstStyle/>
-          <a:p>
-            <a:endParaRPr lang="en-US"/>
-          </a:p>
-        </p:txBody>
-      </p:sp>
-      <p:sp>
-        <p:nvSpPr>
-          <p:cNvPr id="4" name="Content Placeholder 3"/>
-          <p:cNvSpPr>
-            <a:spLocks noGrp="1"/>
-          </p:cNvSpPr>
-          <p:nvPr>
-            <p:ph sz="half" idx="2"/>
-          </p:nvPr>
-        </p:nvSpPr>
-        <p:spPr/>
-        <p:txBody>
-          <a:bodyPr/>
-          <a:lstStyle/>
-          <a:p>
-            <a:endParaRPr lang="en-US"/>
+        </p:nvPicPr>
+        <p:blipFill>
+          <a:blip r:embed="rId2">
+            <a:extLst>
+              <a:ext uri="{28A0092B-C50C-407E-A947-70E740481C1C}">
+                <a14:useLocalDpi xmlns:a14="http://schemas.microsoft.com/office/drawing/2010/main" val="0"/>
+              </a:ext>
+            </a:extLst>
+          </a:blip>
+          <a:srcRect/>
+          <a:stretch>
+            <a:fillRect/>
+          </a:stretch>
+        </p:blipFill>
+        <p:spPr bwMode="auto">
+          <a:xfrm>
+            <a:off x="982622" y="1842447"/>
+            <a:ext cx="2397474" cy="392314"/>
+          </a:xfrm>
+          <a:prstGeom prst="rect">
+            <a:avLst/>
+          </a:prstGeom>
+          <a:noFill/>
+          <a:ln>
+            <a:noFill/>
+          </a:ln>
+          <a:extLst>
+            <a:ext uri="{909E8E84-426E-40DD-AFC4-6F175D3DCCD1}">
+              <a14:hiddenFill xmlns:a14="http://schemas.microsoft.com/office/drawing/2010/main">
+                <a:solidFill>
+                  <a:schemeClr val="accent1"/>
+                </a:solidFill>
+              </a14:hiddenFill>
+            </a:ext>
+            <a:ext uri="{91240B29-F687-4F45-9708-019B960494DF}">
+              <a14:hiddenLine xmlns:a14="http://schemas.microsoft.com/office/drawing/2010/main" w="9525">
+                <a:solidFill>
+                  <a:schemeClr val="tx1"/>
+                </a:solidFill>
+                <a:miter lim="800000"/>
+                <a:headEnd/>
+                <a:tailEnd/>
+              </a14:hiddenLine>
+            </a:ext>
+          </a:extLst>
+        </p:spPr>
+      </p:pic>
+      <p:cxnSp>
+        <p:nvCxnSpPr>
+          <p:cNvPr id="6" name="Straight Connector 5"/>
+          <p:cNvCxnSpPr/>
+          <p:nvPr/>
+        </p:nvCxnSpPr>
+        <p:spPr>
+          <a:xfrm flipV="1">
+            <a:off x="2388356" y="1842448"/>
+            <a:ext cx="163773" cy="382137"/>
+          </a:xfrm>
+          <a:prstGeom prst="line">
+            <a:avLst/>
+          </a:prstGeom>
+          <a:ln>
+            <a:solidFill>
+              <a:srgbClr val="C00000"/>
+            </a:solidFill>
+          </a:ln>
+        </p:spPr>
+        <p:style>
+          <a:lnRef idx="3">
+            <a:schemeClr val="accent1"/>
+          </a:lnRef>
+          <a:fillRef idx="0">
+            <a:schemeClr val="accent1"/>
+          </a:fillRef>
+          <a:effectRef idx="2">
+            <a:schemeClr val="accent1"/>
+          </a:effectRef>
+          <a:fontRef idx="minor">
+            <a:schemeClr val="tx1"/>
+          </a:fontRef>
+        </p:style>
+      </p:cxnSp>
+      <p:cxnSp>
+        <p:nvCxnSpPr>
+          <p:cNvPr id="8" name="Straight Connector 7"/>
+          <p:cNvCxnSpPr/>
+          <p:nvPr/>
+        </p:nvCxnSpPr>
+        <p:spPr>
+          <a:xfrm flipV="1">
+            <a:off x="2922895" y="1842447"/>
+            <a:ext cx="163773" cy="382137"/>
+          </a:xfrm>
+          <a:prstGeom prst="line">
+            <a:avLst/>
+          </a:prstGeom>
+          <a:ln>
+            <a:solidFill>
+              <a:srgbClr val="C00000"/>
+            </a:solidFill>
+          </a:ln>
+        </p:spPr>
+        <p:style>
+          <a:lnRef idx="3">
+            <a:schemeClr val="accent1"/>
+          </a:lnRef>
+          <a:fillRef idx="0">
+            <a:schemeClr val="accent1"/>
+          </a:fillRef>
+          <a:effectRef idx="2">
+            <a:schemeClr val="accent1"/>
+          </a:effectRef>
+          <a:fontRef idx="minor">
+            <a:schemeClr val="tx1"/>
+          </a:fontRef>
+        </p:style>
+      </p:cxnSp>
+      <p:pic>
+        <p:nvPicPr>
+          <p:cNvPr id="2051" name="Picture 3"/>
+          <p:cNvPicPr>
+            <a:picLocks noChangeAspect="1" noChangeArrowheads="1"/>
+          </p:cNvPicPr>
+          <p:nvPr/>
+        </p:nvPicPr>
+        <p:blipFill>
+          <a:blip r:embed="rId3">
+            <a:extLst>
+              <a:ext uri="{28A0092B-C50C-407E-A947-70E740481C1C}">
+                <a14:useLocalDpi xmlns:a14="http://schemas.microsoft.com/office/drawing/2010/main" val="0"/>
+              </a:ext>
+            </a:extLst>
+          </a:blip>
+          <a:srcRect/>
+          <a:stretch>
+            <a:fillRect/>
+          </a:stretch>
+        </p:blipFill>
+        <p:spPr bwMode="auto">
+          <a:xfrm>
+            <a:off x="984559" y="2819526"/>
+            <a:ext cx="4791075" cy="742950"/>
+          </a:xfrm>
+          <a:prstGeom prst="rect">
+            <a:avLst/>
+          </a:prstGeom>
+          <a:noFill/>
+          <a:ln>
+            <a:noFill/>
+          </a:ln>
+          <a:extLst>
+            <a:ext uri="{909E8E84-426E-40DD-AFC4-6F175D3DCCD1}">
+              <a14:hiddenFill xmlns:a14="http://schemas.microsoft.com/office/drawing/2010/main">
+                <a:solidFill>
+                  <a:schemeClr val="accent1"/>
+                </a:solidFill>
+              </a14:hiddenFill>
+            </a:ext>
+            <a:ext uri="{91240B29-F687-4F45-9708-019B960494DF}">
+              <a14:hiddenLine xmlns:a14="http://schemas.microsoft.com/office/drawing/2010/main" w="9525">
+                <a:solidFill>
+                  <a:schemeClr val="tx1"/>
+                </a:solidFill>
+                <a:miter lim="800000"/>
+                <a:headEnd/>
+                <a:tailEnd/>
+              </a14:hiddenLine>
+            </a:ext>
+          </a:extLst>
+        </p:spPr>
+      </p:pic>
+      <p:sp>
+        <p:nvSpPr>
+          <p:cNvPr id="7" name="TextBox 6"/>
+          <p:cNvSpPr txBox="1"/>
+          <p:nvPr/>
+        </p:nvSpPr>
+        <p:spPr>
+          <a:xfrm>
+            <a:off x="1146411" y="2450194"/>
+            <a:ext cx="2115403" cy="369332"/>
+          </a:xfrm>
+          <a:prstGeom prst="rect">
+            <a:avLst/>
+          </a:prstGeom>
+          <a:noFill/>
+        </p:spPr>
+        <p:txBody>
+          <a:bodyPr wrap="square" rtlCol="0">
+            <a:spAutoFit/>
+          </a:bodyPr>
+          <a:lstStyle/>
+          <a:p>
+            <a:r>
+              <a:rPr lang="en-US" dirty="0" smtClean="0"/>
+              <a:t>where</a:t>
+            </a:r>
+            <a:endParaRPr lang="en-US" dirty="0"/>
           </a:p>
         </p:txBody>
       </p:sp>
@@ -4292,6 +4494,151 @@
     <p:extLst>
       <p:ext uri="{BB962C8B-B14F-4D97-AF65-F5344CB8AC3E}">
         <p14:creationId xmlns:p14="http://schemas.microsoft.com/office/powerpoint/2010/main" val="3331768039"/>
+      </p:ext>
+    </p:extLst>
+  </p:cSld>
+  <p:clrMapOvr>
+    <a:masterClrMapping/>
+  </p:clrMapOvr>
+</p:sld>
+</file>
+
+<file path=ppt/slides/slide7.xml><?xml version="1.0" encoding="utf-8"?>
+<p:sld xmlns:a="http://schemas.openxmlformats.org/drawingml/2006/main" xmlns:r="http://schemas.openxmlformats.org/officeDocument/2006/relationships" xmlns:p="http://schemas.openxmlformats.org/presentationml/2006/main">
+  <p:cSld>
+    <p:spTree>
+      <p:nvGrpSpPr>
+        <p:cNvPr id="1" name=""/>
+        <p:cNvGrpSpPr/>
+        <p:nvPr/>
+      </p:nvGrpSpPr>
+      <p:grpSpPr>
+        <a:xfrm>
+          <a:off x="0" y="0"/>
+          <a:ext cx="0" cy="0"/>
+          <a:chOff x="0" y="0"/>
+          <a:chExt cx="0" cy="0"/>
+        </a:xfrm>
+      </p:grpSpPr>
+      <p:sp>
+        <p:nvSpPr>
+          <p:cNvPr id="2" name="Title 1"/>
+          <p:cNvSpPr>
+            <a:spLocks noGrp="1"/>
+          </p:cNvSpPr>
+          <p:nvPr>
+            <p:ph type="title"/>
+          </p:nvPr>
+        </p:nvSpPr>
+        <p:spPr/>
+        <p:txBody>
+          <a:bodyPr/>
+          <a:lstStyle/>
+          <a:p>
+            <a:r>
+              <a:rPr lang="en-US" dirty="0" smtClean="0"/>
+              <a:t>Error Approximation</a:t>
+            </a:r>
+            <a:endParaRPr lang="en-US" dirty="0"/>
+          </a:p>
+        </p:txBody>
+      </p:sp>
+      <p:sp>
+        <p:nvSpPr>
+          <p:cNvPr id="3" name="Content Placeholder 2"/>
+          <p:cNvSpPr>
+            <a:spLocks noGrp="1"/>
+          </p:cNvSpPr>
+          <p:nvPr>
+            <p:ph sz="half" idx="1"/>
+          </p:nvPr>
+        </p:nvSpPr>
+        <p:spPr>
+          <a:xfrm>
+            <a:off x="838200" y="1825625"/>
+            <a:ext cx="9097370" cy="1927509"/>
+          </a:xfrm>
+        </p:spPr>
+        <p:txBody>
+          <a:bodyPr/>
+          <a:lstStyle/>
+          <a:p>
+            <a:r>
+              <a:rPr lang="en-US" dirty="0" smtClean="0"/>
+              <a:t>The Concentric Cylinder Model (CCM) is used to check the accuracy of the MOC code.</a:t>
+            </a:r>
+          </a:p>
+          <a:p>
+            <a:endParaRPr lang="en-US" dirty="0"/>
+          </a:p>
+          <a:p>
+            <a:endParaRPr lang="en-US" dirty="0" smtClean="0"/>
+          </a:p>
+          <a:p>
+            <a:endParaRPr lang="en-US" dirty="0"/>
+          </a:p>
+        </p:txBody>
+      </p:sp>
+      <p:pic>
+        <p:nvPicPr>
+          <p:cNvPr id="1026" name="Picture 2"/>
+          <p:cNvPicPr>
+            <a:picLocks noGrp="1" noChangeAspect="1" noChangeArrowheads="1"/>
+          </p:cNvPicPr>
+          <p:nvPr>
+            <p:ph sz="half" idx="2"/>
+          </p:nvPr>
+        </p:nvPicPr>
+        <p:blipFill>
+          <a:blip r:embed="rId2">
+            <a:extLst>
+              <a:ext uri="{28A0092B-C50C-407E-A947-70E740481C1C}">
+                <a14:useLocalDpi xmlns:a14="http://schemas.microsoft.com/office/drawing/2010/main" val="0"/>
+              </a:ext>
+            </a:extLst>
+          </a:blip>
+          <a:srcRect/>
+          <a:stretch>
+            <a:fillRect/>
+          </a:stretch>
+        </p:blipFill>
+        <p:spPr bwMode="auto">
+          <a:xfrm>
+            <a:off x="1105323" y="3070746"/>
+            <a:ext cx="9605596" cy="3086999"/>
+          </a:xfrm>
+          <a:prstGeom prst="rect">
+            <a:avLst/>
+          </a:prstGeom>
+          <a:noFill/>
+          <a:ln>
+            <a:noFill/>
+          </a:ln>
+          <a:extLst>
+            <a:ext uri="{909E8E84-426E-40DD-AFC4-6F175D3DCCD1}">
+              <a14:hiddenFill xmlns:a14="http://schemas.microsoft.com/office/drawing/2010/main">
+                <a:solidFill>
+                  <a:schemeClr val="accent1"/>
+                </a:solidFill>
+              </a14:hiddenFill>
+            </a:ext>
+            <a:ext uri="{91240B29-F687-4F45-9708-019B960494DF}">
+              <a14:hiddenLine xmlns:a14="http://schemas.microsoft.com/office/drawing/2010/main" w="9525">
+                <a:solidFill>
+                  <a:schemeClr val="tx1"/>
+                </a:solidFill>
+                <a:miter lim="800000"/>
+                <a:headEnd/>
+                <a:tailEnd/>
+              </a14:hiddenLine>
+            </a:ext>
+          </a:extLst>
+        </p:spPr>
+      </p:pic>
+    </p:spTree>
+    <p:extLst>
+      <p:ext uri="{BB962C8B-B14F-4D97-AF65-F5344CB8AC3E}">
+        <p14:creationId xmlns:p14="http://schemas.microsoft.com/office/powerpoint/2010/main" val="1900943380"/>
       </p:ext>
     </p:extLst>
   </p:cSld>
@@ -4556,7 +4903,7 @@
   <a:extraClrSchemeLst/>
   <a:extLst>
     <a:ext uri="{05A4C25C-085E-4340-85A3-A5531E510DB2}">
-      <thm15:themeFamily xmlns:thm15="http://schemas.microsoft.com/office/thememl/2012/main" name="Office Theme" id="{62F939B6-93AF-4DB8-9C6B-D6C7DFDC589F}" vid="{4A3C46E8-61CC-4603-A589-7422A47A8E4A}"/>
+      <thm15:themeFamily xmlns:thm15="http://schemas.microsoft.com/office/thememl/2012/main" xmlns="" name="Office Theme" id="{62F939B6-93AF-4DB8-9C6B-D6C7DFDC589F}" vid="{4A3C46E8-61CC-4603-A589-7422A47A8E4A}"/>
     </a:ext>
   </a:extLst>
 </a:theme>
@@ -4817,7 +5164,7 @@
   <a:extraClrSchemeLst/>
   <a:extLst>
     <a:ext uri="{05A4C25C-085E-4340-85A3-A5531E510DB2}">
-      <thm15:themeFamily xmlns:thm15="http://schemas.microsoft.com/office/thememl/2012/main" name="Office Theme" id="{62F939B6-93AF-4DB8-9C6B-D6C7DFDC589F}" vid="{4A3C46E8-61CC-4603-A589-7422A47A8E4A}"/>
+      <thm15:themeFamily xmlns:thm15="http://schemas.microsoft.com/office/thememl/2012/main" xmlns="" name="Office Theme" id="{62F939B6-93AF-4DB8-9C6B-D6C7DFDC589F}" vid="{4A3C46E8-61CC-4603-A589-7422A47A8E4A}"/>
     </a:ext>
   </a:extLst>
 </a:theme>

</xml_diff>